<commit_message>
modify i2c report and spi report : 驅動框架
</commit_message>
<xml_diff>
--- a/i2c_report_ben.pptx
+++ b/i2c_report_ben.pptx
@@ -245,7 +245,7 @@
             <a:fld id="{325154A4-CA18-43B2-977D-6DF08BA83A3D}" type="datetimeFigureOut">
               <a:rPr lang="zh-TW" altLang="en-US" smtClean="0"/>
               <a:pPr/>
-              <a:t>2015/9/18</a:t>
+              <a:t>2015/10/6</a:t>
             </a:fld>
             <a:endParaRPr lang="zh-TW" altLang="en-US"/>
           </a:p>
@@ -321,7 +321,7 @@
     </p:spTree>
     <p:extLst>
       <p:ext uri="{BB962C8B-B14F-4D97-AF65-F5344CB8AC3E}">
-        <p14:creationId xmlns:p14="http://schemas.microsoft.com/office/powerpoint/2010/main" xmlns="" val="1745725823"/>
+        <p14:creationId xmlns="" xmlns:p14="http://schemas.microsoft.com/office/powerpoint/2010/main" val="1745725823"/>
       </p:ext>
     </p:extLst>
   </p:cSld>
@@ -412,7 +412,7 @@
             <a:fld id="{956157D8-F6D7-4F1C-8521-742A313DD9E2}" type="datetimeFigureOut">
               <a:rPr lang="zh-TW" altLang="en-US" smtClean="0"/>
               <a:pPr/>
-              <a:t>2015/9/18</a:t>
+              <a:t>2015/10/6</a:t>
             </a:fld>
             <a:endParaRPr lang="zh-TW" altLang="en-US"/>
           </a:p>
@@ -583,7 +583,7 @@
     </p:spTree>
     <p:extLst>
       <p:ext uri="{BB962C8B-B14F-4D97-AF65-F5344CB8AC3E}">
-        <p14:creationId xmlns:p14="http://schemas.microsoft.com/office/powerpoint/2010/main" xmlns="" val="3871340698"/>
+        <p14:creationId xmlns="" xmlns:p14="http://schemas.microsoft.com/office/powerpoint/2010/main" val="3871340698"/>
       </p:ext>
     </p:extLst>
   </p:cSld>
@@ -1352,7 +1352,7 @@
           <a:blip r:embed="rId2" cstate="print">
             <a:extLst>
               <a:ext uri="{28A0092B-C50C-407E-A947-70E740481C1C}">
-                <a14:useLocalDpi xmlns:a14="http://schemas.microsoft.com/office/drawing/2010/main" xmlns="" val="0"/>
+                <a14:useLocalDpi xmlns="" xmlns:a14="http://schemas.microsoft.com/office/drawing/2010/main" val="0"/>
               </a:ext>
             </a:extLst>
           </a:blip>
@@ -1718,7 +1718,7 @@
     </p:spTree>
     <p:extLst>
       <p:ext uri="{BB962C8B-B14F-4D97-AF65-F5344CB8AC3E}">
-        <p14:creationId xmlns:p14="http://schemas.microsoft.com/office/powerpoint/2010/main" xmlns="" val="1604652190"/>
+        <p14:creationId xmlns="" xmlns:p14="http://schemas.microsoft.com/office/powerpoint/2010/main" val="1604652190"/>
       </p:ext>
     </p:extLst>
   </p:cSld>
@@ -1764,7 +1764,7 @@
           <a:blip r:embed="rId2" cstate="print">
             <a:extLst>
               <a:ext uri="{28A0092B-C50C-407E-A947-70E740481C1C}">
-                <a14:useLocalDpi xmlns:a14="http://schemas.microsoft.com/office/drawing/2010/main" xmlns="" val="0"/>
+                <a14:useLocalDpi xmlns="" xmlns:a14="http://schemas.microsoft.com/office/drawing/2010/main" val="0"/>
               </a:ext>
             </a:extLst>
           </a:blip>
@@ -1852,7 +1852,7 @@
     </p:spTree>
     <p:extLst>
       <p:ext uri="{BB962C8B-B14F-4D97-AF65-F5344CB8AC3E}">
-        <p14:creationId xmlns:p14="http://schemas.microsoft.com/office/powerpoint/2010/main" xmlns="" val="3828523544"/>
+        <p14:creationId xmlns="" xmlns:p14="http://schemas.microsoft.com/office/powerpoint/2010/main" val="3828523544"/>
       </p:ext>
     </p:extLst>
   </p:cSld>
@@ -4807,7 +4807,7 @@
           <a:blip r:embed="rId10" cstate="print">
             <a:extLst>
               <a:ext uri="{28A0092B-C50C-407E-A947-70E740481C1C}">
-                <a14:useLocalDpi xmlns:a14="http://schemas.microsoft.com/office/drawing/2010/main" xmlns="" val="0"/>
+                <a14:useLocalDpi xmlns="" xmlns:a14="http://schemas.microsoft.com/office/drawing/2010/main" val="0"/>
               </a:ext>
             </a:extLst>
           </a:blip>
@@ -5506,7 +5506,7 @@
                 <a:tabLst/>
                 <a:defRPr/>
               </a:pPr>
-              <a:t>2015/9/18</a:t>
+              <a:t>2015/10/6</a:t>
             </a:fld>
             <a:endParaRPr kumimoji="0" lang="zh-TW" altLang="en-US" sz="1050" b="0" i="0" u="none" strike="noStrike" kern="1200" cap="none" spc="0" normalizeH="0" baseline="0" noProof="0" dirty="0">
               <a:ln>
@@ -5531,7 +5531,7 @@
     </p:spTree>
     <p:extLst>
       <p:ext uri="{BB962C8B-B14F-4D97-AF65-F5344CB8AC3E}">
-        <p14:creationId xmlns:p14="http://schemas.microsoft.com/office/powerpoint/2010/main" xmlns="" val="495258064"/>
+        <p14:creationId xmlns="" xmlns:p14="http://schemas.microsoft.com/office/powerpoint/2010/main" val="495258064"/>
       </p:ext>
     </p:extLst>
   </p:cSld>
@@ -5614,7 +5614,7 @@
     </p:spTree>
     <p:extLst>
       <p:ext uri="{BB962C8B-B14F-4D97-AF65-F5344CB8AC3E}">
-        <p14:creationId xmlns:p14="http://schemas.microsoft.com/office/powerpoint/2010/main" xmlns="" val="1188013231"/>
+        <p14:creationId xmlns="" xmlns:p14="http://schemas.microsoft.com/office/powerpoint/2010/main" val="1188013231"/>
       </p:ext>
     </p:extLst>
   </p:cSld>
@@ -6747,7 +6747,7 @@
     </p:spTree>
     <p:extLst>
       <p:ext uri="{BB962C8B-B14F-4D97-AF65-F5344CB8AC3E}">
-        <p14:creationId xmlns:p14="http://schemas.microsoft.com/office/powerpoint/2010/main" xmlns="" val="1188013231"/>
+        <p14:creationId xmlns="" xmlns:p14="http://schemas.microsoft.com/office/powerpoint/2010/main" val="1188013231"/>
       </p:ext>
     </p:extLst>
   </p:cSld>
@@ -6847,7 +6847,7 @@
     </p:spTree>
     <p:extLst>
       <p:ext uri="{BB962C8B-B14F-4D97-AF65-F5344CB8AC3E}">
-        <p14:creationId xmlns:p14="http://schemas.microsoft.com/office/powerpoint/2010/main" xmlns="" val="553085013"/>
+        <p14:creationId xmlns="" xmlns:p14="http://schemas.microsoft.com/office/powerpoint/2010/main" val="553085013"/>
       </p:ext>
     </p:extLst>
   </p:cSld>
@@ -7580,7 +7580,7 @@
     </p:spTree>
     <p:extLst>
       <p:ext uri="{BB962C8B-B14F-4D97-AF65-F5344CB8AC3E}">
-        <p14:creationId xmlns="" xmlns:p14="http://schemas.microsoft.com/office/powerpoint/2010/main" val="3577142735"/>
+        <p14:creationId xmlns:p14="http://schemas.microsoft.com/office/powerpoint/2010/main" xmlns="" val="3577142735"/>
       </p:ext>
     </p:extLst>
   </p:cSld>
@@ -8552,7 +8552,7 @@
     </p:spTree>
     <p:extLst>
       <p:ext uri="{BB962C8B-B14F-4D97-AF65-F5344CB8AC3E}">
-        <p14:creationId xmlns:p14="http://schemas.microsoft.com/office/powerpoint/2010/main" xmlns="" val="1188013231"/>
+        <p14:creationId xmlns="" xmlns:p14="http://schemas.microsoft.com/office/powerpoint/2010/main" val="1188013231"/>
       </p:ext>
     </p:extLst>
   </p:cSld>
@@ -10816,7 +10816,7 @@
     </p:spTree>
     <p:extLst>
       <p:ext uri="{BB962C8B-B14F-4D97-AF65-F5344CB8AC3E}">
-        <p14:creationId xmlns:p14="http://schemas.microsoft.com/office/powerpoint/2010/main" xmlns="" val="2423379894"/>
+        <p14:creationId xmlns="" xmlns:p14="http://schemas.microsoft.com/office/powerpoint/2010/main" val="2423379894"/>
       </p:ext>
     </p:extLst>
   </p:cSld>
@@ -12085,7 +12085,7 @@
     </p:spTree>
     <p:extLst>
       <p:ext uri="{BB962C8B-B14F-4D97-AF65-F5344CB8AC3E}">
-        <p14:creationId xmlns:p14="http://schemas.microsoft.com/office/powerpoint/2010/main" xmlns="" val="2423379894"/>
+        <p14:creationId xmlns="" xmlns:p14="http://schemas.microsoft.com/office/powerpoint/2010/main" val="2423379894"/>
       </p:ext>
     </p:extLst>
   </p:cSld>
@@ -12856,7 +12856,7 @@
     </p:spTree>
     <p:extLst>
       <p:ext uri="{BB962C8B-B14F-4D97-AF65-F5344CB8AC3E}">
-        <p14:creationId xmlns:p14="http://schemas.microsoft.com/office/powerpoint/2010/main" xmlns="" val="1188013231"/>
+        <p14:creationId xmlns="" xmlns:p14="http://schemas.microsoft.com/office/powerpoint/2010/main" val="1188013231"/>
       </p:ext>
     </p:extLst>
   </p:cSld>
@@ -14360,7 +14360,7 @@
     </p:spTree>
     <p:extLst>
       <p:ext uri="{BB962C8B-B14F-4D97-AF65-F5344CB8AC3E}">
-        <p14:creationId xmlns:p14="http://schemas.microsoft.com/office/powerpoint/2010/main" xmlns="" val="2423379894"/>
+        <p14:creationId xmlns="" xmlns:p14="http://schemas.microsoft.com/office/powerpoint/2010/main" val="2423379894"/>
       </p:ext>
     </p:extLst>
   </p:cSld>
@@ -14515,7 +14515,7 @@
         </p:nvSpPr>
         <p:spPr>
           <a:xfrm>
-            <a:off x="1691680" y="2569468"/>
+            <a:off x="1691680" y="2641476"/>
             <a:ext cx="576064" cy="504056"/>
           </a:xfrm>
           <a:prstGeom prst="rect">
@@ -14602,8 +14602,8 @@
         </p:nvCxnSpPr>
         <p:spPr>
           <a:xfrm flipV="1">
-            <a:off x="1979712" y="3073524"/>
-            <a:ext cx="0" cy="504056"/>
+            <a:off x="1979712" y="3145532"/>
+            <a:ext cx="0" cy="432048"/>
           </a:xfrm>
           <a:prstGeom prst="straightConnector1">
             <a:avLst/>
@@ -14638,8 +14638,8 @@
         </p:nvCxnSpPr>
         <p:spPr>
           <a:xfrm flipV="1">
-            <a:off x="1187624" y="2821496"/>
-            <a:ext cx="504056" cy="540060"/>
+            <a:off x="1187624" y="2893504"/>
+            <a:ext cx="504056" cy="468052"/>
           </a:xfrm>
           <a:prstGeom prst="straightConnector1">
             <a:avLst/>
@@ -14957,14 +14957,14 @@
           <p:cNvPr id="42" name="直線單箭頭接點 41"/>
           <p:cNvCxnSpPr>
             <a:stCxn id="11" idx="0"/>
-            <a:endCxn id="40" idx="1"/>
+            <a:endCxn id="40" idx="2"/>
           </p:cNvCxnSpPr>
           <p:nvPr/>
         </p:nvCxnSpPr>
         <p:spPr>
           <a:xfrm flipV="1">
-            <a:off x="1979712" y="1957400"/>
-            <a:ext cx="648072" cy="612068"/>
+            <a:off x="1979712" y="2497460"/>
+            <a:ext cx="1260140" cy="144016"/>
           </a:xfrm>
           <a:prstGeom prst="straightConnector1">
             <a:avLst/>
@@ -15438,8 +15438,8 @@
         </p:nvSpPr>
         <p:spPr>
           <a:xfrm>
-            <a:off x="1619672" y="2497460"/>
-            <a:ext cx="720080" cy="1656184"/>
+            <a:off x="1619672" y="2569468"/>
+            <a:ext cx="720080" cy="1584176"/>
           </a:xfrm>
           <a:prstGeom prst="rect">
             <a:avLst/>
@@ -15669,7 +15669,7 @@
         <p:spPr>
           <a:xfrm>
             <a:off x="1475656" y="2353444"/>
-            <a:ext cx="1008112" cy="0"/>
+            <a:ext cx="936104" cy="0"/>
           </a:xfrm>
           <a:prstGeom prst="line">
             <a:avLst/>
@@ -15707,7 +15707,7 @@
         </p:nvCxnSpPr>
         <p:spPr>
           <a:xfrm flipV="1">
-            <a:off x="2483768" y="1345332"/>
+            <a:off x="2411760" y="1345332"/>
             <a:ext cx="0" cy="1008112"/>
           </a:xfrm>
           <a:prstGeom prst="line">
@@ -15746,7 +15746,7 @@
         </p:nvCxnSpPr>
         <p:spPr>
           <a:xfrm>
-            <a:off x="1475656" y="3217540"/>
+            <a:off x="1475656" y="3361556"/>
             <a:ext cx="1008112" cy="0"/>
           </a:xfrm>
           <a:prstGeom prst="line">
@@ -15786,7 +15786,7 @@
         <p:spPr>
           <a:xfrm>
             <a:off x="1475656" y="2353444"/>
-            <a:ext cx="0" cy="864096"/>
+            <a:ext cx="0" cy="1008112"/>
           </a:xfrm>
           <a:prstGeom prst="line">
             <a:avLst/>
@@ -15824,8 +15824,8 @@
         </p:nvCxnSpPr>
         <p:spPr>
           <a:xfrm flipV="1">
-            <a:off x="2483768" y="3217540"/>
-            <a:ext cx="0" cy="1080120"/>
+            <a:off x="2483768" y="3361556"/>
+            <a:ext cx="0" cy="936104"/>
           </a:xfrm>
           <a:prstGeom prst="line">
             <a:avLst/>
@@ -16010,7 +16010,7 @@
         </p:nvSpPr>
         <p:spPr>
           <a:xfrm>
-            <a:off x="1520756" y="2137420"/>
+            <a:off x="2699792" y="1057300"/>
             <a:ext cx="1467068" cy="246221"/>
           </a:xfrm>
           <a:prstGeom prst="rect">
@@ -16112,7 +16112,6 @@
               <a:rPr lang="en-US" sz="1600" dirty="0" smtClean="0"/>
               <a:t>i2c_add_numbered_adapter </a:t>
             </a:r>
-            <a:endParaRPr lang="en-US" sz="1600" dirty="0" smtClean="0"/>
           </a:p>
           <a:p>
             <a:pPr>
@@ -16142,16 +16141,140 @@
             </a:pPr>
             <a:r>
               <a:rPr lang="en-US" sz="1600" dirty="0" smtClean="0"/>
-              <a:t>Device Tree (</a:t>
-            </a:r>
-            <a:r>
-              <a:rPr lang="en-US" sz="1600" smtClean="0"/>
-              <a:t>platform device)</a:t>
+              <a:t>Device Tree (platform device)</a:t>
             </a:r>
             <a:endParaRPr lang="en-US" sz="1400" dirty="0"/>
           </a:p>
         </p:txBody>
       </p:sp>
+      <p:sp>
+        <p:nvSpPr>
+          <p:cNvPr id="51" name="矩形 50"/>
+          <p:cNvSpPr/>
+          <p:nvPr/>
+        </p:nvSpPr>
+        <p:spPr>
+          <a:xfrm>
+            <a:off x="1691680" y="1561356"/>
+            <a:ext cx="576064" cy="504056"/>
+          </a:xfrm>
+          <a:prstGeom prst="rect">
+            <a:avLst/>
+          </a:prstGeom>
+        </p:spPr>
+        <p:style>
+          <a:lnRef idx="1">
+            <a:schemeClr val="dk1"/>
+          </a:lnRef>
+          <a:fillRef idx="2">
+            <a:schemeClr val="dk1"/>
+          </a:fillRef>
+          <a:effectRef idx="1">
+            <a:schemeClr val="dk1"/>
+          </a:effectRef>
+          <a:fontRef idx="minor">
+            <a:schemeClr val="dk1"/>
+          </a:fontRef>
+        </p:style>
+        <p:txBody>
+          <a:bodyPr rtlCol="0" anchor="ctr"/>
+          <a:lstStyle/>
+          <a:p>
+            <a:pPr algn="ctr"/>
+            <a:r>
+              <a:rPr lang="en-US" altLang="zh-TW" sz="800" dirty="0" smtClean="0">
+                <a:solidFill>
+                  <a:schemeClr val="tx1"/>
+                </a:solidFill>
+              </a:rPr>
+              <a:t>board info</a:t>
+            </a:r>
+            <a:endParaRPr lang="zh-TW" altLang="en-US" sz="800" dirty="0" smtClean="0">
+              <a:solidFill>
+                <a:schemeClr val="tx1"/>
+              </a:solidFill>
+            </a:endParaRPr>
+          </a:p>
+        </p:txBody>
+      </p:sp>
+      <p:cxnSp>
+        <p:nvCxnSpPr>
+          <p:cNvPr id="63" name="直線單箭頭接點 62"/>
+          <p:cNvCxnSpPr>
+            <a:stCxn id="51" idx="3"/>
+            <a:endCxn id="40" idx="1"/>
+          </p:cNvCxnSpPr>
+          <p:nvPr/>
+        </p:nvCxnSpPr>
+        <p:spPr>
+          <a:xfrm>
+            <a:off x="2267744" y="1813384"/>
+            <a:ext cx="360040" cy="144016"/>
+          </a:xfrm>
+          <a:prstGeom prst="straightConnector1">
+            <a:avLst/>
+          </a:prstGeom>
+          <a:ln>
+            <a:tailEnd type="arrow"/>
+          </a:ln>
+        </p:spPr>
+        <p:style>
+          <a:lnRef idx="1">
+            <a:schemeClr val="accent1"/>
+          </a:lnRef>
+          <a:fillRef idx="0">
+            <a:schemeClr val="accent1"/>
+          </a:fillRef>
+          <a:effectRef idx="0">
+            <a:schemeClr val="accent1"/>
+          </a:effectRef>
+          <a:fontRef idx="minor">
+            <a:schemeClr val="tx1"/>
+          </a:fontRef>
+        </p:style>
+      </p:cxnSp>
+      <p:cxnSp>
+        <p:nvCxnSpPr>
+          <p:cNvPr id="70" name="直線接點 69"/>
+          <p:cNvCxnSpPr>
+            <a:stCxn id="48" idx="4"/>
+            <a:endCxn id="51" idx="1"/>
+          </p:cNvCxnSpPr>
+          <p:nvPr/>
+        </p:nvCxnSpPr>
+        <p:spPr>
+          <a:xfrm>
+            <a:off x="1403648" y="1345332"/>
+            <a:ext cx="288032" cy="468052"/>
+          </a:xfrm>
+          <a:prstGeom prst="line">
+            <a:avLst/>
+          </a:prstGeom>
+          <a:ln w="22225">
+            <a:solidFill>
+              <a:schemeClr val="accent4">
+                <a:lumMod val="40000"/>
+                <a:lumOff val="60000"/>
+              </a:schemeClr>
+            </a:solidFill>
+            <a:prstDash val="sysDot"/>
+          </a:ln>
+        </p:spPr>
+        <p:style>
+          <a:lnRef idx="1">
+            <a:schemeClr val="accent1"/>
+          </a:lnRef>
+          <a:fillRef idx="0">
+            <a:schemeClr val="accent1"/>
+          </a:fillRef>
+          <a:effectRef idx="0">
+            <a:schemeClr val="accent1"/>
+          </a:effectRef>
+          <a:fontRef idx="minor">
+            <a:schemeClr val="tx1"/>
+          </a:fontRef>
+        </p:style>
+      </p:cxnSp>
     </p:spTree>
   </p:cSld>
   <p:clrMapOvr>

</xml_diff>

<commit_message>
spi report modified 10/08
</commit_message>
<xml_diff>
--- a/i2c_report_ben.pptx
+++ b/i2c_report_ben.pptx
@@ -245,7 +245,7 @@
             <a:fld id="{325154A4-CA18-43B2-977D-6DF08BA83A3D}" type="datetimeFigureOut">
               <a:rPr lang="zh-TW" altLang="en-US" smtClean="0"/>
               <a:pPr/>
-              <a:t>2015/10/6</a:t>
+              <a:t>2015/10/7</a:t>
             </a:fld>
             <a:endParaRPr lang="zh-TW" altLang="en-US"/>
           </a:p>
@@ -321,7 +321,7 @@
     </p:spTree>
     <p:extLst>
       <p:ext uri="{BB962C8B-B14F-4D97-AF65-F5344CB8AC3E}">
-        <p14:creationId xmlns="" xmlns:p14="http://schemas.microsoft.com/office/powerpoint/2010/main" val="1745725823"/>
+        <p14:creationId xmlns:p14="http://schemas.microsoft.com/office/powerpoint/2010/main" xmlns="" val="1745725823"/>
       </p:ext>
     </p:extLst>
   </p:cSld>
@@ -412,7 +412,7 @@
             <a:fld id="{956157D8-F6D7-4F1C-8521-742A313DD9E2}" type="datetimeFigureOut">
               <a:rPr lang="zh-TW" altLang="en-US" smtClean="0"/>
               <a:pPr/>
-              <a:t>2015/10/6</a:t>
+              <a:t>2015/10/7</a:t>
             </a:fld>
             <a:endParaRPr lang="zh-TW" altLang="en-US"/>
           </a:p>
@@ -583,7 +583,7 @@
     </p:spTree>
     <p:extLst>
       <p:ext uri="{BB962C8B-B14F-4D97-AF65-F5344CB8AC3E}">
-        <p14:creationId xmlns="" xmlns:p14="http://schemas.microsoft.com/office/powerpoint/2010/main" val="3871340698"/>
+        <p14:creationId xmlns:p14="http://schemas.microsoft.com/office/powerpoint/2010/main" xmlns="" val="3871340698"/>
       </p:ext>
     </p:extLst>
   </p:cSld>
@@ -1352,7 +1352,7 @@
           <a:blip r:embed="rId2" cstate="print">
             <a:extLst>
               <a:ext uri="{28A0092B-C50C-407E-A947-70E740481C1C}">
-                <a14:useLocalDpi xmlns="" xmlns:a14="http://schemas.microsoft.com/office/drawing/2010/main" val="0"/>
+                <a14:useLocalDpi xmlns:a14="http://schemas.microsoft.com/office/drawing/2010/main" xmlns="" val="0"/>
               </a:ext>
             </a:extLst>
           </a:blip>
@@ -1718,7 +1718,7 @@
     </p:spTree>
     <p:extLst>
       <p:ext uri="{BB962C8B-B14F-4D97-AF65-F5344CB8AC3E}">
-        <p14:creationId xmlns="" xmlns:p14="http://schemas.microsoft.com/office/powerpoint/2010/main" val="1604652190"/>
+        <p14:creationId xmlns:p14="http://schemas.microsoft.com/office/powerpoint/2010/main" xmlns="" val="1604652190"/>
       </p:ext>
     </p:extLst>
   </p:cSld>
@@ -1764,7 +1764,7 @@
           <a:blip r:embed="rId2" cstate="print">
             <a:extLst>
               <a:ext uri="{28A0092B-C50C-407E-A947-70E740481C1C}">
-                <a14:useLocalDpi xmlns="" xmlns:a14="http://schemas.microsoft.com/office/drawing/2010/main" val="0"/>
+                <a14:useLocalDpi xmlns:a14="http://schemas.microsoft.com/office/drawing/2010/main" xmlns="" val="0"/>
               </a:ext>
             </a:extLst>
           </a:blip>
@@ -1852,7 +1852,7 @@
     </p:spTree>
     <p:extLst>
       <p:ext uri="{BB962C8B-B14F-4D97-AF65-F5344CB8AC3E}">
-        <p14:creationId xmlns="" xmlns:p14="http://schemas.microsoft.com/office/powerpoint/2010/main" val="3828523544"/>
+        <p14:creationId xmlns:p14="http://schemas.microsoft.com/office/powerpoint/2010/main" xmlns="" val="3828523544"/>
       </p:ext>
     </p:extLst>
   </p:cSld>
@@ -4807,7 +4807,7 @@
           <a:blip r:embed="rId10" cstate="print">
             <a:extLst>
               <a:ext uri="{28A0092B-C50C-407E-A947-70E740481C1C}">
-                <a14:useLocalDpi xmlns="" xmlns:a14="http://schemas.microsoft.com/office/drawing/2010/main" val="0"/>
+                <a14:useLocalDpi xmlns:a14="http://schemas.microsoft.com/office/drawing/2010/main" xmlns="" val="0"/>
               </a:ext>
             </a:extLst>
           </a:blip>
@@ -5506,7 +5506,7 @@
                 <a:tabLst/>
                 <a:defRPr/>
               </a:pPr>
-              <a:t>2015/10/6</a:t>
+              <a:t>2015/10/7</a:t>
             </a:fld>
             <a:endParaRPr kumimoji="0" lang="zh-TW" altLang="en-US" sz="1050" b="0" i="0" u="none" strike="noStrike" kern="1200" cap="none" spc="0" normalizeH="0" baseline="0" noProof="0" dirty="0">
               <a:ln>
@@ -5531,7 +5531,7 @@
     </p:spTree>
     <p:extLst>
       <p:ext uri="{BB962C8B-B14F-4D97-AF65-F5344CB8AC3E}">
-        <p14:creationId xmlns="" xmlns:p14="http://schemas.microsoft.com/office/powerpoint/2010/main" val="495258064"/>
+        <p14:creationId xmlns:p14="http://schemas.microsoft.com/office/powerpoint/2010/main" xmlns="" val="495258064"/>
       </p:ext>
     </p:extLst>
   </p:cSld>
@@ -5614,7 +5614,7 @@
     </p:spTree>
     <p:extLst>
       <p:ext uri="{BB962C8B-B14F-4D97-AF65-F5344CB8AC3E}">
-        <p14:creationId xmlns="" xmlns:p14="http://schemas.microsoft.com/office/powerpoint/2010/main" val="1188013231"/>
+        <p14:creationId xmlns:p14="http://schemas.microsoft.com/office/powerpoint/2010/main" xmlns="" val="1188013231"/>
       </p:ext>
     </p:extLst>
   </p:cSld>
@@ -6747,7 +6747,7 @@
     </p:spTree>
     <p:extLst>
       <p:ext uri="{BB962C8B-B14F-4D97-AF65-F5344CB8AC3E}">
-        <p14:creationId xmlns="" xmlns:p14="http://schemas.microsoft.com/office/powerpoint/2010/main" val="1188013231"/>
+        <p14:creationId xmlns:p14="http://schemas.microsoft.com/office/powerpoint/2010/main" xmlns="" val="1188013231"/>
       </p:ext>
     </p:extLst>
   </p:cSld>
@@ -6847,7 +6847,7 @@
     </p:spTree>
     <p:extLst>
       <p:ext uri="{BB962C8B-B14F-4D97-AF65-F5344CB8AC3E}">
-        <p14:creationId xmlns="" xmlns:p14="http://schemas.microsoft.com/office/powerpoint/2010/main" val="553085013"/>
+        <p14:creationId xmlns:p14="http://schemas.microsoft.com/office/powerpoint/2010/main" xmlns="" val="553085013"/>
       </p:ext>
     </p:extLst>
   </p:cSld>
@@ -7580,7 +7580,7 @@
     </p:spTree>
     <p:extLst>
       <p:ext uri="{BB962C8B-B14F-4D97-AF65-F5344CB8AC3E}">
-        <p14:creationId xmlns:p14="http://schemas.microsoft.com/office/powerpoint/2010/main" xmlns="" val="3577142735"/>
+        <p14:creationId xmlns="" xmlns:p14="http://schemas.microsoft.com/office/powerpoint/2010/main" val="3577142735"/>
       </p:ext>
     </p:extLst>
   </p:cSld>
@@ -8552,7 +8552,7 @@
     </p:spTree>
     <p:extLst>
       <p:ext uri="{BB962C8B-B14F-4D97-AF65-F5344CB8AC3E}">
-        <p14:creationId xmlns="" xmlns:p14="http://schemas.microsoft.com/office/powerpoint/2010/main" val="1188013231"/>
+        <p14:creationId xmlns:p14="http://schemas.microsoft.com/office/powerpoint/2010/main" xmlns="" val="1188013231"/>
       </p:ext>
     </p:extLst>
   </p:cSld>
@@ -10816,7 +10816,7 @@
     </p:spTree>
     <p:extLst>
       <p:ext uri="{BB962C8B-B14F-4D97-AF65-F5344CB8AC3E}">
-        <p14:creationId xmlns="" xmlns:p14="http://schemas.microsoft.com/office/powerpoint/2010/main" val="2423379894"/>
+        <p14:creationId xmlns:p14="http://schemas.microsoft.com/office/powerpoint/2010/main" xmlns="" val="2423379894"/>
       </p:ext>
     </p:extLst>
   </p:cSld>
@@ -12085,7 +12085,7 @@
     </p:spTree>
     <p:extLst>
       <p:ext uri="{BB962C8B-B14F-4D97-AF65-F5344CB8AC3E}">
-        <p14:creationId xmlns="" xmlns:p14="http://schemas.microsoft.com/office/powerpoint/2010/main" val="2423379894"/>
+        <p14:creationId xmlns:p14="http://schemas.microsoft.com/office/powerpoint/2010/main" xmlns="" val="2423379894"/>
       </p:ext>
     </p:extLst>
   </p:cSld>
@@ -12856,7 +12856,7 @@
     </p:spTree>
     <p:extLst>
       <p:ext uri="{BB962C8B-B14F-4D97-AF65-F5344CB8AC3E}">
-        <p14:creationId xmlns="" xmlns:p14="http://schemas.microsoft.com/office/powerpoint/2010/main" val="1188013231"/>
+        <p14:creationId xmlns:p14="http://schemas.microsoft.com/office/powerpoint/2010/main" xmlns="" val="1188013231"/>
       </p:ext>
     </p:extLst>
   </p:cSld>
@@ -14360,7 +14360,7 @@
     </p:spTree>
     <p:extLst>
       <p:ext uri="{BB962C8B-B14F-4D97-AF65-F5344CB8AC3E}">
-        <p14:creationId xmlns="" xmlns:p14="http://schemas.microsoft.com/office/powerpoint/2010/main" val="2423379894"/>
+        <p14:creationId xmlns:p14="http://schemas.microsoft.com/office/powerpoint/2010/main" xmlns="" val="2423379894"/>
       </p:ext>
     </p:extLst>
   </p:cSld>
@@ -14494,7 +14494,11 @@
             <a:pPr algn="ctr"/>
             <a:r>
               <a:rPr lang="en-US" altLang="zh-TW" sz="1000" dirty="0" smtClean="0"/>
-              <a:t>Platform device : </a:t>
+              <a:t>platform </a:t>
+            </a:r>
+            <a:r>
+              <a:rPr lang="en-US" altLang="zh-TW" sz="1000" dirty="0" smtClean="0"/>
+              <a:t>device : </a:t>
             </a:r>
             <a:br>
               <a:rPr lang="en-US" altLang="zh-TW" sz="1000" dirty="0" smtClean="0"/>
@@ -14854,7 +14858,11 @@
             <a:pPr algn="ctr"/>
             <a:r>
               <a:rPr lang="en-US" altLang="zh-TW" sz="1000" dirty="0" smtClean="0"/>
-              <a:t>Platform driver : </a:t>
+              <a:t>platform </a:t>
+            </a:r>
+            <a:r>
+              <a:rPr lang="en-US" altLang="zh-TW" sz="1000" dirty="0" smtClean="0"/>
+              <a:t>driver : </a:t>
             </a:r>
             <a:br>
               <a:rPr lang="en-US" altLang="zh-TW" sz="1000" dirty="0" smtClean="0"/>
@@ -15110,7 +15118,11 @@
             <a:pPr algn="ctr"/>
             <a:r>
               <a:rPr lang="en-US" altLang="zh-TW" sz="1000" dirty="0" smtClean="0"/>
-              <a:t>Client driver</a:t>
+              <a:t>client </a:t>
+            </a:r>
+            <a:r>
+              <a:rPr lang="en-US" altLang="zh-TW" sz="1000" dirty="0" smtClean="0"/>
+              <a:t>driver</a:t>
             </a:r>
             <a:endParaRPr lang="zh-TW" altLang="en-US" sz="1000" dirty="0" smtClean="0"/>
           </a:p>
@@ -15152,7 +15164,11 @@
             <a:pPr algn="ctr"/>
             <a:r>
               <a:rPr lang="en-US" altLang="zh-TW" sz="1200" dirty="0" smtClean="0"/>
-              <a:t>Device tree</a:t>
+              <a:t>device </a:t>
+            </a:r>
+            <a:r>
+              <a:rPr lang="en-US" altLang="zh-TW" sz="1200" dirty="0" smtClean="0"/>
+              <a:t>tree</a:t>
             </a:r>
             <a:endParaRPr lang="zh-TW" altLang="en-US" sz="1200" dirty="0" smtClean="0"/>
           </a:p>

</xml_diff>

<commit_message>
add linux i2c jpeg for html
</commit_message>
<xml_diff>
--- a/i2c_report_ben.pptx
+++ b/i2c_report_ben.pptx
@@ -248,7 +248,7 @@
             <a:fld id="{325154A4-CA18-43B2-977D-6DF08BA83A3D}" type="datetimeFigureOut">
               <a:rPr lang="zh-TW" altLang="en-US" smtClean="0"/>
               <a:pPr/>
-              <a:t>2015/10/23</a:t>
+              <a:t>2015/10/26</a:t>
             </a:fld>
             <a:endParaRPr lang="zh-TW" altLang="en-US"/>
           </a:p>
@@ -324,7 +324,7 @@
     </p:spTree>
     <p:extLst>
       <p:ext uri="{BB962C8B-B14F-4D97-AF65-F5344CB8AC3E}">
-        <p14:creationId xmlns="" xmlns:p14="http://schemas.microsoft.com/office/powerpoint/2010/main" val="1745725823"/>
+        <p14:creationId xmlns:p14="http://schemas.microsoft.com/office/powerpoint/2010/main" xmlns="" val="1745725823"/>
       </p:ext>
     </p:extLst>
   </p:cSld>
@@ -415,7 +415,7 @@
             <a:fld id="{956157D8-F6D7-4F1C-8521-742A313DD9E2}" type="datetimeFigureOut">
               <a:rPr lang="zh-TW" altLang="en-US" smtClean="0"/>
               <a:pPr/>
-              <a:t>2015/10/23</a:t>
+              <a:t>2015/10/26</a:t>
             </a:fld>
             <a:endParaRPr lang="zh-TW" altLang="en-US"/>
           </a:p>
@@ -586,7 +586,7 @@
     </p:spTree>
     <p:extLst>
       <p:ext uri="{BB962C8B-B14F-4D97-AF65-F5344CB8AC3E}">
-        <p14:creationId xmlns="" xmlns:p14="http://schemas.microsoft.com/office/powerpoint/2010/main" val="3871340698"/>
+        <p14:creationId xmlns:p14="http://schemas.microsoft.com/office/powerpoint/2010/main" xmlns="" val="3871340698"/>
       </p:ext>
     </p:extLst>
   </p:cSld>
@@ -1844,11 +1844,7 @@
           <a:p>
             <a:r>
               <a:rPr lang="en-US" altLang="zh-TW" dirty="0" smtClean="0"/>
-              <a:t>Sgt15000 </a:t>
-            </a:r>
-            <a:r>
-              <a:rPr lang="en-US" altLang="zh-TW" dirty="0" smtClean="0"/>
-              <a:t>: audio machine 	at24 :</a:t>
+              <a:t>Sgt15000 : audio machine 	at24 :</a:t>
             </a:r>
             <a:r>
               <a:rPr lang="en-US" altLang="zh-TW" baseline="0" dirty="0" smtClean="0"/>
@@ -2378,7 +2374,7 @@
           <a:blip r:embed="rId2" cstate="print">
             <a:extLst>
               <a:ext uri="{28A0092B-C50C-407E-A947-70E740481C1C}">
-                <a14:useLocalDpi xmlns="" xmlns:a14="http://schemas.microsoft.com/office/drawing/2010/main" val="0"/>
+                <a14:useLocalDpi xmlns:a14="http://schemas.microsoft.com/office/drawing/2010/main" xmlns="" val="0"/>
               </a:ext>
             </a:extLst>
           </a:blip>
@@ -2744,7 +2740,7 @@
     </p:spTree>
     <p:extLst>
       <p:ext uri="{BB962C8B-B14F-4D97-AF65-F5344CB8AC3E}">
-        <p14:creationId xmlns="" xmlns:p14="http://schemas.microsoft.com/office/powerpoint/2010/main" val="1604652190"/>
+        <p14:creationId xmlns:p14="http://schemas.microsoft.com/office/powerpoint/2010/main" xmlns="" val="1604652190"/>
       </p:ext>
     </p:extLst>
   </p:cSld>
@@ -2790,7 +2786,7 @@
           <a:blip r:embed="rId2" cstate="print">
             <a:extLst>
               <a:ext uri="{28A0092B-C50C-407E-A947-70E740481C1C}">
-                <a14:useLocalDpi xmlns="" xmlns:a14="http://schemas.microsoft.com/office/drawing/2010/main" val="0"/>
+                <a14:useLocalDpi xmlns:a14="http://schemas.microsoft.com/office/drawing/2010/main" xmlns="" val="0"/>
               </a:ext>
             </a:extLst>
           </a:blip>
@@ -2878,7 +2874,7 @@
     </p:spTree>
     <p:extLst>
       <p:ext uri="{BB962C8B-B14F-4D97-AF65-F5344CB8AC3E}">
-        <p14:creationId xmlns="" xmlns:p14="http://schemas.microsoft.com/office/powerpoint/2010/main" val="3828523544"/>
+        <p14:creationId xmlns:p14="http://schemas.microsoft.com/office/powerpoint/2010/main" xmlns="" val="3828523544"/>
       </p:ext>
     </p:extLst>
   </p:cSld>
@@ -5833,7 +5829,7 @@
           <a:blip r:embed="rId10" cstate="print">
             <a:extLst>
               <a:ext uri="{28A0092B-C50C-407E-A947-70E740481C1C}">
-                <a14:useLocalDpi xmlns="" xmlns:a14="http://schemas.microsoft.com/office/drawing/2010/main" val="0"/>
+                <a14:useLocalDpi xmlns:a14="http://schemas.microsoft.com/office/drawing/2010/main" xmlns="" val="0"/>
               </a:ext>
             </a:extLst>
           </a:blip>
@@ -6532,7 +6528,7 @@
                 <a:tabLst/>
                 <a:defRPr/>
               </a:pPr>
-              <a:t>2015/10/23</a:t>
+              <a:t>2015/10/26</a:t>
             </a:fld>
             <a:endParaRPr kumimoji="0" lang="zh-TW" altLang="en-US" sz="1050" b="0" i="0" u="none" strike="noStrike" kern="1200" cap="none" spc="0" normalizeH="0" baseline="0" noProof="0" dirty="0">
               <a:ln>
@@ -6557,7 +6553,7 @@
     </p:spTree>
     <p:extLst>
       <p:ext uri="{BB962C8B-B14F-4D97-AF65-F5344CB8AC3E}">
-        <p14:creationId xmlns="" xmlns:p14="http://schemas.microsoft.com/office/powerpoint/2010/main" val="495258064"/>
+        <p14:creationId xmlns:p14="http://schemas.microsoft.com/office/powerpoint/2010/main" xmlns="" val="495258064"/>
       </p:ext>
     </p:extLst>
   </p:cSld>
@@ -6972,11 +6968,7 @@
             <a:pPr algn="ctr"/>
             <a:r>
               <a:rPr lang="en-US" altLang="zh-TW" sz="1000" dirty="0" smtClean="0"/>
-              <a:t>i2c </a:t>
-            </a:r>
-            <a:r>
-              <a:rPr lang="en-US" altLang="zh-TW" sz="1000" dirty="0" smtClean="0"/>
-              <a:t>device</a:t>
+              <a:t>i2c device</a:t>
             </a:r>
             <a:endParaRPr lang="zh-TW" altLang="en-US" sz="1000" dirty="0" smtClean="0"/>
           </a:p>
@@ -7311,11 +7303,7 @@
             <a:pPr algn="ctr"/>
             <a:r>
               <a:rPr lang="en-US" altLang="zh-TW" sz="1000" dirty="0" smtClean="0"/>
-              <a:t>i2c </a:t>
-            </a:r>
-            <a:r>
-              <a:rPr lang="en-US" altLang="zh-TW" sz="1000" dirty="0" smtClean="0"/>
-              <a:t>driver</a:t>
+              <a:t>i2c driver</a:t>
             </a:r>
             <a:endParaRPr lang="zh-TW" altLang="en-US" sz="1000" dirty="0" smtClean="0"/>
           </a:p>
@@ -8284,23 +8272,7 @@
                   <a:schemeClr val="tx1"/>
                 </a:solidFill>
               </a:rPr>
-              <a:t>i</a:t>
-            </a:r>
-            <a:r>
-              <a:rPr lang="en-US" altLang="zh-TW" sz="800" dirty="0" smtClean="0">
-                <a:solidFill>
-                  <a:schemeClr val="tx1"/>
-                </a:solidFill>
-              </a:rPr>
-              <a:t>2c board </a:t>
-            </a:r>
-            <a:r>
-              <a:rPr lang="en-US" altLang="zh-TW" sz="800" dirty="0" smtClean="0">
-                <a:solidFill>
-                  <a:schemeClr val="tx1"/>
-                </a:solidFill>
-              </a:rPr>
-              <a:t>info</a:t>
+              <a:t>i2c board info</a:t>
             </a:r>
             <a:endParaRPr lang="zh-TW" altLang="en-US" sz="800" dirty="0" smtClean="0">
               <a:solidFill>
@@ -10624,11 +10596,7 @@
             </a:r>
             <a:r>
               <a:rPr lang="en-US" altLang="zh-TW" sz="1000" dirty="0" smtClean="0"/>
-              <a:t> </a:t>
-            </a:r>
-            <a:r>
-              <a:rPr lang="en-US" altLang="zh-TW" sz="1000" dirty="0" smtClean="0"/>
-              <a:t>Mode</a:t>
+              <a:t> Mode</a:t>
             </a:r>
             <a:endParaRPr lang="zh-TW" altLang="en-US" sz="1000" dirty="0" smtClean="0"/>
           </a:p>
@@ -10685,11 +10653,7 @@
             <a:pPr algn="ctr"/>
             <a:r>
               <a:rPr lang="en-US" altLang="zh-TW" sz="700" dirty="0" smtClean="0"/>
-              <a:t>Data(8) </a:t>
-            </a:r>
-            <a:r>
-              <a:rPr lang="en-US" altLang="zh-TW" sz="700" dirty="0" smtClean="0"/>
-              <a:t>= </a:t>
+              <a:t>Data(8) = </a:t>
             </a:r>
             <a:r>
               <a:rPr lang="en-US" altLang="zh-TW" sz="700" dirty="0" err="1" smtClean="0"/>
@@ -10697,15 +10661,7 @@
             </a:r>
             <a:r>
               <a:rPr lang="en-US" altLang="zh-TW" sz="700" dirty="0" smtClean="0"/>
-              <a:t>(7) </a:t>
-            </a:r>
-            <a:r>
-              <a:rPr lang="en-US" altLang="zh-TW" sz="700" dirty="0" smtClean="0"/>
-              <a:t>+ </a:t>
-            </a:r>
-            <a:r>
-              <a:rPr lang="en-US" altLang="zh-TW" sz="700" dirty="0" smtClean="0"/>
-              <a:t>W/R(1)</a:t>
+              <a:t>(7) + W/R(1)</a:t>
             </a:r>
             <a:endParaRPr lang="zh-TW" altLang="en-US" sz="700" dirty="0" smtClean="0"/>
           </a:p>
@@ -11262,15 +11218,7 @@
             <a:pPr algn="ctr"/>
             <a:r>
               <a:rPr lang="en-US" altLang="zh-TW" sz="1000" dirty="0" smtClean="0"/>
-              <a:t>Set I2C to </a:t>
-            </a:r>
-            <a:r>
-              <a:rPr lang="en-US" altLang="zh-TW" sz="1000" dirty="0" smtClean="0"/>
-              <a:t>Rx </a:t>
-            </a:r>
-            <a:r>
-              <a:rPr lang="en-US" altLang="zh-TW" sz="1000" dirty="0" smtClean="0"/>
-              <a:t>Mode</a:t>
+              <a:t>Set I2C to Rx Mode</a:t>
             </a:r>
             <a:endParaRPr lang="zh-TW" altLang="en-US" sz="1000" dirty="0" smtClean="0"/>
           </a:p>
@@ -11319,11 +11267,7 @@
             <a:pPr algn="ctr"/>
             <a:r>
               <a:rPr lang="en-US" altLang="zh-TW" sz="1000" dirty="0" smtClean="0"/>
-              <a:t>Read </a:t>
-            </a:r>
-            <a:r>
-              <a:rPr lang="en-US" altLang="zh-TW" sz="1000" dirty="0" smtClean="0"/>
-              <a:t>Rx Buffer</a:t>
+              <a:t>Read Rx Buffer</a:t>
             </a:r>
           </a:p>
         </p:txBody>
@@ -11622,11 +11566,7 @@
             </a:r>
             <a:r>
               <a:rPr lang="zh-TW" altLang="en-US" sz="1000" b="1" dirty="0" smtClean="0"/>
-              <a:t>等實際上</a:t>
-            </a:r>
-            <a:r>
-              <a:rPr lang="zh-TW" altLang="en-US" sz="1000" b="1" dirty="0" smtClean="0"/>
-              <a:t>的</a:t>
+              <a:t>等實際上的</a:t>
             </a:r>
             <a:r>
               <a:rPr lang="en-US" altLang="zh-TW" sz="1000" b="1" dirty="0" err="1" smtClean="0"/>
@@ -13301,7 +13241,7 @@
     </p:spTree>
     <p:extLst>
       <p:ext uri="{BB962C8B-B14F-4D97-AF65-F5344CB8AC3E}">
-        <p14:creationId xmlns="" xmlns:p14="http://schemas.microsoft.com/office/powerpoint/2010/main" val="553085013"/>
+        <p14:creationId xmlns:p14="http://schemas.microsoft.com/office/powerpoint/2010/main" xmlns="" val="553085013"/>
       </p:ext>
     </p:extLst>
   </p:cSld>
@@ -15143,23 +15083,7 @@
                   <a:schemeClr val="tx1"/>
                 </a:solidFill>
               </a:rPr>
-              <a:t>i</a:t>
-            </a:r>
-            <a:r>
-              <a:rPr lang="en-US" altLang="zh-TW" sz="800" dirty="0" smtClean="0">
-                <a:solidFill>
-                  <a:schemeClr val="tx1"/>
-                </a:solidFill>
-              </a:rPr>
-              <a:t>2c board </a:t>
-            </a:r>
-            <a:r>
-              <a:rPr lang="en-US" altLang="zh-TW" sz="800" dirty="0" smtClean="0">
-                <a:solidFill>
-                  <a:schemeClr val="tx1"/>
-                </a:solidFill>
-              </a:rPr>
-              <a:t>info</a:t>
+              <a:t>i2c board info</a:t>
             </a:r>
             <a:endParaRPr lang="zh-TW" altLang="en-US" sz="800" dirty="0" smtClean="0">
               <a:solidFill>
@@ -19528,13 +19452,8 @@
             <a:pPr lvl="1"/>
             <a:r>
               <a:rPr lang="en-US" altLang="zh-TW" dirty="0" smtClean="0"/>
-              <a:t>I2C Packet </a:t>
-            </a:r>
-            <a:r>
-              <a:rPr lang="en-US" altLang="zh-TW" dirty="0" smtClean="0"/>
-              <a:t>Format</a:t>
-            </a:r>
-            <a:endParaRPr lang="en-US" altLang="zh-TW" dirty="0" smtClean="0"/>
+              <a:t>I2C Packet Format</a:t>
+            </a:r>
           </a:p>
           <a:p>
             <a:r>
@@ -19605,7 +19524,7 @@
     </p:spTree>
     <p:extLst>
       <p:ext uri="{BB962C8B-B14F-4D97-AF65-F5344CB8AC3E}">
-        <p14:creationId xmlns:p14="http://schemas.microsoft.com/office/powerpoint/2010/main" xmlns="" val="3577142735"/>
+        <p14:creationId xmlns="" xmlns:p14="http://schemas.microsoft.com/office/powerpoint/2010/main" val="3577142735"/>
       </p:ext>
     </p:extLst>
   </p:cSld>
@@ -19757,15 +19676,7 @@
           <a:p>
             <a:r>
               <a:rPr lang="en-US" altLang="zh-TW" dirty="0" smtClean="0"/>
-              <a:t>Detail Register </a:t>
-            </a:r>
-            <a:r>
-              <a:rPr lang="en-US" altLang="zh-TW" dirty="0" smtClean="0"/>
-              <a:t>Description - MTXR</a:t>
-            </a:r>
-            <a:r>
-              <a:rPr lang="en-US" altLang="zh-TW" dirty="0" smtClean="0"/>
-              <a:t/>
+              <a:t>Detail Register Description - MTXR</a:t>
             </a:r>
             <a:br>
               <a:rPr lang="en-US" altLang="zh-TW" dirty="0" smtClean="0"/>
@@ -19870,15 +19781,7 @@
           <a:p>
             <a:r>
               <a:rPr lang="en-US" altLang="zh-TW" dirty="0" smtClean="0"/>
-              <a:t>Detail Register </a:t>
-            </a:r>
-            <a:r>
-              <a:rPr lang="en-US" altLang="zh-TW" dirty="0" smtClean="0"/>
-              <a:t>Description – SRXR, SADDR</a:t>
-            </a:r>
-            <a:r>
-              <a:rPr lang="en-US" altLang="zh-TW" dirty="0" smtClean="0"/>
-              <a:t/>
+              <a:t>Detail Register Description – SRXR, SADDR</a:t>
             </a:r>
             <a:br>
               <a:rPr lang="en-US" altLang="zh-TW" dirty="0" smtClean="0"/>
@@ -19981,11 +19884,7 @@
           <a:p>
             <a:r>
               <a:rPr lang="en-US" altLang="zh-TW" dirty="0" smtClean="0"/>
-              <a:t>Detail Register </a:t>
-            </a:r>
-            <a:r>
-              <a:rPr lang="en-US" altLang="zh-TW" dirty="0" smtClean="0"/>
-              <a:t>Description – I2C_IER</a:t>
+              <a:t>Detail Register Description – I2C_IER</a:t>
             </a:r>
             <a:endParaRPr lang="zh-TW" altLang="en-US" dirty="0"/>
           </a:p>
@@ -20085,11 +19984,7 @@
           <a:p>
             <a:r>
               <a:rPr lang="en-US" altLang="zh-TW" dirty="0" smtClean="0"/>
-              <a:t>Detail Register </a:t>
-            </a:r>
-            <a:r>
-              <a:rPr lang="en-US" altLang="zh-TW" dirty="0" smtClean="0"/>
-              <a:t>Description - ISR</a:t>
+              <a:t>Detail Register Description - ISR</a:t>
             </a:r>
             <a:endParaRPr lang="zh-TW" altLang="en-US" dirty="0"/>
           </a:p>
@@ -20188,11 +20083,7 @@
           <a:p>
             <a:r>
               <a:rPr lang="en-US" altLang="zh-TW" dirty="0" smtClean="0"/>
-              <a:t>Detail Register </a:t>
-            </a:r>
-            <a:r>
-              <a:rPr lang="en-US" altLang="zh-TW" dirty="0" smtClean="0"/>
-              <a:t>Description - LCMR</a:t>
+              <a:t>Detail Register Description - LCMR</a:t>
             </a:r>
             <a:endParaRPr lang="zh-TW" altLang="en-US" dirty="0"/>
           </a:p>
@@ -20292,11 +20183,7 @@
           <a:p>
             <a:r>
               <a:rPr lang="en-US" altLang="zh-TW" dirty="0" smtClean="0"/>
-              <a:t>Detail Register </a:t>
-            </a:r>
-            <a:r>
-              <a:rPr lang="en-US" altLang="zh-TW" dirty="0" smtClean="0"/>
-              <a:t>Description - LSR</a:t>
+              <a:t>Detail Register Description - LSR</a:t>
             </a:r>
             <a:endParaRPr lang="zh-TW" altLang="en-US" dirty="0"/>
           </a:p>
@@ -20396,11 +20283,7 @@
           <a:p>
             <a:r>
               <a:rPr lang="en-US" altLang="zh-TW" dirty="0" smtClean="0"/>
-              <a:t>Detail Register </a:t>
-            </a:r>
-            <a:r>
-              <a:rPr lang="en-US" altLang="zh-TW" dirty="0" smtClean="0"/>
-              <a:t>Description - CONR</a:t>
+              <a:t>Detail Register Description - CONR</a:t>
             </a:r>
             <a:endParaRPr lang="zh-TW" altLang="en-US" dirty="0"/>
           </a:p>
@@ -20500,11 +20383,7 @@
           <a:p>
             <a:r>
               <a:rPr lang="en-US" altLang="zh-TW" dirty="0" smtClean="0"/>
-              <a:t>Detail Register </a:t>
-            </a:r>
-            <a:r>
-              <a:rPr lang="en-US" altLang="zh-TW" dirty="0" smtClean="0"/>
-              <a:t>Description - OPR</a:t>
+              <a:t>Detail Register Description - OPR</a:t>
             </a:r>
             <a:endParaRPr lang="zh-TW" altLang="en-US" dirty="0"/>
           </a:p>
@@ -22362,7 +22241,7 @@
     </p:spTree>
     <p:extLst>
       <p:ext uri="{BB962C8B-B14F-4D97-AF65-F5344CB8AC3E}">
-        <p14:creationId xmlns="" xmlns:p14="http://schemas.microsoft.com/office/powerpoint/2010/main" val="1188013231"/>
+        <p14:creationId xmlns:p14="http://schemas.microsoft.com/office/powerpoint/2010/main" xmlns="" val="1188013231"/>
       </p:ext>
     </p:extLst>
   </p:cSld>
@@ -22903,7 +22782,7 @@
     </p:spTree>
     <p:extLst>
       <p:ext uri="{BB962C8B-B14F-4D97-AF65-F5344CB8AC3E}">
-        <p14:creationId xmlns="" xmlns:p14="http://schemas.microsoft.com/office/powerpoint/2010/main" val="2423379894"/>
+        <p14:creationId xmlns:p14="http://schemas.microsoft.com/office/powerpoint/2010/main" xmlns="" val="2423379894"/>
       </p:ext>
     </p:extLst>
   </p:cSld>
@@ -23179,7 +23058,7 @@
     </p:spTree>
     <p:extLst>
       <p:ext uri="{BB962C8B-B14F-4D97-AF65-F5344CB8AC3E}">
-        <p14:creationId xmlns="" xmlns:p14="http://schemas.microsoft.com/office/powerpoint/2010/main" val="2423379894"/>
+        <p14:creationId xmlns:p14="http://schemas.microsoft.com/office/powerpoint/2010/main" xmlns="" val="2423379894"/>
       </p:ext>
     </p:extLst>
   </p:cSld>
@@ -24124,7 +24003,7 @@
     </p:spTree>
     <p:extLst>
       <p:ext uri="{BB962C8B-B14F-4D97-AF65-F5344CB8AC3E}">
-        <p14:creationId xmlns="" xmlns:p14="http://schemas.microsoft.com/office/powerpoint/2010/main" val="2423379894"/>
+        <p14:creationId xmlns:p14="http://schemas.microsoft.com/office/powerpoint/2010/main" xmlns="" val="2423379894"/>
       </p:ext>
     </p:extLst>
   </p:cSld>
@@ -24953,17 +24832,7 @@
                   </a:schemeClr>
                 </a:solidFill>
               </a:rPr>
-              <a:t>Slave </a:t>
-            </a:r>
-            <a:r>
-              <a:rPr lang="en-US" sz="1600" b="1" dirty="0" smtClean="0">
-                <a:solidFill>
-                  <a:schemeClr val="tx2">
-                    <a:lumMod val="75000"/>
-                  </a:schemeClr>
-                </a:solidFill>
-              </a:rPr>
-              <a:t>Address </a:t>
+              <a:t>Slave Address </a:t>
             </a:r>
             <a:r>
               <a:rPr lang="en-US" sz="1600" dirty="0" smtClean="0"/>
@@ -25208,7 +25077,7 @@
     </p:spTree>
     <p:extLst>
       <p:ext uri="{BB962C8B-B14F-4D97-AF65-F5344CB8AC3E}">
-        <p14:creationId xmlns="" xmlns:p14="http://schemas.microsoft.com/office/powerpoint/2010/main" val="2423379894"/>
+        <p14:creationId xmlns:p14="http://schemas.microsoft.com/office/powerpoint/2010/main" xmlns="" val="2423379894"/>
       </p:ext>
     </p:extLst>
   </p:cSld>
@@ -25259,11 +25128,7 @@
           <a:p>
             <a:r>
               <a:rPr lang="en-US" altLang="zh-TW" dirty="0" smtClean="0"/>
-              <a:t>I2C Packet </a:t>
-            </a:r>
-            <a:r>
-              <a:rPr lang="en-US" altLang="zh-TW" dirty="0" smtClean="0"/>
-              <a:t>Format </a:t>
+              <a:t>I2C Packet Format </a:t>
             </a:r>
             <a:r>
               <a:rPr lang="en-US" altLang="zh-TW" dirty="0" smtClean="0">
@@ -25274,18 +25139,7 @@
                   </a:schemeClr>
                 </a:solidFill>
               </a:rPr>
-              <a:t>– </a:t>
-            </a:r>
-            <a:r>
-              <a:rPr lang="en-US" altLang="zh-TW" dirty="0" smtClean="0">
-                <a:solidFill>
-                  <a:schemeClr val="tx1">
-                    <a:lumMod val="95000"/>
-                    <a:lumOff val="5000"/>
-                  </a:schemeClr>
-                </a:solidFill>
-              </a:rPr>
-              <a:t>Write And Read</a:t>
+              <a:t>– Write And Read</a:t>
             </a:r>
           </a:p>
         </p:txBody>
@@ -26493,19 +26347,7 @@
           <a:p>
             <a:r>
               <a:rPr lang="zh-TW" altLang="en-US" sz="1000" b="1" dirty="0" smtClean="0"/>
-              <a:t>讀取資料</a:t>
-            </a:r>
-            <a:r>
-              <a:rPr lang="zh-TW" altLang="en-US" sz="1000" b="1" dirty="0" smtClean="0"/>
-              <a:t>的</a:t>
-            </a:r>
-            <a:r>
-              <a:rPr lang="zh-TW" altLang="en-US" sz="1000" b="1" dirty="0" smtClean="0"/>
-              <a:t>起始</a:t>
-            </a:r>
-            <a:r>
-              <a:rPr lang="zh-TW" altLang="en-US" sz="1000" b="1" dirty="0" smtClean="0"/>
-              <a:t>位置</a:t>
+              <a:t>讀取資料的起始位置</a:t>
             </a:r>
             <a:endParaRPr lang="zh-TW" altLang="en-US" sz="1000" b="1" dirty="0"/>
           </a:p>
@@ -26730,7 +26572,7 @@
     </p:spTree>
     <p:extLst>
       <p:ext uri="{BB962C8B-B14F-4D97-AF65-F5344CB8AC3E}">
-        <p14:creationId xmlns="" xmlns:p14="http://schemas.microsoft.com/office/powerpoint/2010/main" val="2423379894"/>
+        <p14:creationId xmlns:p14="http://schemas.microsoft.com/office/powerpoint/2010/main" xmlns="" val="2423379894"/>
       </p:ext>
     </p:extLst>
   </p:cSld>
@@ -26818,7 +26660,7 @@
     </p:spTree>
     <p:extLst>
       <p:ext uri="{BB962C8B-B14F-4D97-AF65-F5344CB8AC3E}">
-        <p14:creationId xmlns="" xmlns:p14="http://schemas.microsoft.com/office/powerpoint/2010/main" val="1188013231"/>
+        <p14:creationId xmlns:p14="http://schemas.microsoft.com/office/powerpoint/2010/main" xmlns="" val="1188013231"/>
       </p:ext>
     </p:extLst>
   </p:cSld>
@@ -28146,7 +27988,7 @@
         </p:nvSpPr>
         <p:spPr>
           <a:xfrm>
-            <a:off x="5916654" y="2569468"/>
+            <a:off x="5916654" y="2776200"/>
             <a:ext cx="1140056" cy="369332"/>
           </a:xfrm>
           <a:prstGeom prst="rect">
@@ -28197,8 +28039,8 @@
         </p:nvCxnSpPr>
         <p:spPr>
           <a:xfrm flipV="1">
-            <a:off x="5124566" y="2754134"/>
-            <a:ext cx="792088" cy="247382"/>
+            <a:off x="5124566" y="2960866"/>
+            <a:ext cx="792088" cy="40650"/>
           </a:xfrm>
           <a:prstGeom prst="straightConnector1">
             <a:avLst/>
@@ -28459,7 +28301,7 @@
         </p:nvSpPr>
         <p:spPr>
           <a:xfrm>
-            <a:off x="6156176" y="2281436"/>
+            <a:off x="6279113" y="1633364"/>
             <a:ext cx="2864887" cy="861774"/>
           </a:xfrm>
           <a:prstGeom prst="rect">
@@ -28981,11 +28823,7 @@
             </a:r>
             <a:r>
               <a:rPr lang="zh-TW" altLang="en-US" sz="1000" b="1" dirty="0" smtClean="0"/>
-              <a:t>等實際上</a:t>
-            </a:r>
-            <a:r>
-              <a:rPr lang="zh-TW" altLang="en-US" sz="1000" b="1" dirty="0" smtClean="0"/>
-              <a:t>的</a:t>
+              <a:t>等實際上的</a:t>
             </a:r>
             <a:r>
               <a:rPr lang="en-US" altLang="zh-TW" sz="1000" b="1" dirty="0" err="1" smtClean="0"/>
@@ -29012,8 +28850,8 @@
         </p:nvCxnSpPr>
         <p:spPr>
           <a:xfrm flipV="1">
-            <a:off x="5220072" y="2712323"/>
-            <a:ext cx="936104" cy="145177"/>
+            <a:off x="5436096" y="2064251"/>
+            <a:ext cx="843017" cy="649233"/>
           </a:xfrm>
           <a:prstGeom prst="straightConnector1">
             <a:avLst/>
@@ -29091,7 +28929,7 @@
         </p:nvSpPr>
         <p:spPr>
           <a:xfrm>
-            <a:off x="755576" y="1777380"/>
+            <a:off x="467544" y="1993404"/>
             <a:ext cx="1368152" cy="400110"/>
           </a:xfrm>
           <a:prstGeom prst="rect">
@@ -29107,11 +28945,7 @@
           <a:p>
             <a:r>
               <a:rPr lang="en-US" altLang="zh-TW" sz="1000" b="1" dirty="0" smtClean="0"/>
-              <a:t>I2C Device </a:t>
-            </a:r>
-            <a:r>
-              <a:rPr lang="en-US" altLang="zh-TW" sz="1000" b="1" dirty="0" smtClean="0"/>
-              <a:t>Driver</a:t>
+              <a:t>I2C Device Driver</a:t>
             </a:r>
           </a:p>
           <a:p>
@@ -29143,9 +28977,9 @@
           <p:nvPr/>
         </p:nvCxnSpPr>
         <p:spPr>
-          <a:xfrm flipH="1" flipV="1">
-            <a:off x="2123728" y="1977435"/>
-            <a:ext cx="840598" cy="159985"/>
+          <a:xfrm flipH="1">
+            <a:off x="1835696" y="2137420"/>
+            <a:ext cx="1128630" cy="56039"/>
           </a:xfrm>
           <a:prstGeom prst="straightConnector1">
             <a:avLst/>
@@ -29178,7 +29012,7 @@
     </p:spTree>
     <p:extLst>
       <p:ext uri="{BB962C8B-B14F-4D97-AF65-F5344CB8AC3E}">
-        <p14:creationId xmlns="" xmlns:p14="http://schemas.microsoft.com/office/powerpoint/2010/main" val="2423379894"/>
+        <p14:creationId xmlns:p14="http://schemas.microsoft.com/office/powerpoint/2010/main" xmlns="" val="2423379894"/>
       </p:ext>
     </p:extLst>
   </p:cSld>

</xml_diff>